<commit_message>
Correcciones en los documentos
</commit_message>
<xml_diff>
--- a/grupo2.pptx
+++ b/grupo2.pptx
@@ -14,8 +14,8 @@
     <p:sldId id="256" r:id="rId3"/>
     <p:sldId id="265" r:id="rId4"/>
     <p:sldId id="275" r:id="rId5"/>
-    <p:sldId id="269" r:id="rId6"/>
-    <p:sldId id="279" r:id="rId7"/>
+    <p:sldId id="279" r:id="rId6"/>
+    <p:sldId id="269" r:id="rId7"/>
     <p:sldId id="276" r:id="rId8"/>
     <p:sldId id="277" r:id="rId9"/>
     <p:sldId id="271" r:id="rId10"/>
@@ -281,7 +281,7 @@
           <a:p>
             <a:fld id="{24CE221E-83ED-4F6C-BA5F-3F9E6FDB6953}" type="datetimeFigureOut">
               <a:rPr lang="en-US"/>
-              <a:t>3/31/2016</a:t>
+              <a:t>4/8/2016</a:t>
             </a:fld>
             <a:endParaRPr/>
           </a:p>
@@ -446,7 +446,7 @@
           <a:p>
             <a:fld id="{97853E5F-CE67-483C-A264-F17AC70E9CA2}" type="datetimeFigureOut">
               <a:rPr lang="en-US"/>
-              <a:t>3/31/2016</a:t>
+              <a:t>4/8/2016</a:t>
             </a:fld>
             <a:endParaRPr/>
           </a:p>
@@ -920,7 +920,7 @@
           <a:p>
             <a:fld id="{3E0FA9E5-6744-4841-888F-9E7CC0C2B7EC}" type="datetimeFigureOut">
               <a:rPr lang="en-US"/>
-              <a:t>3/31/2016</a:t>
+              <a:t>4/8/2016</a:t>
             </a:fld>
             <a:endParaRPr/>
           </a:p>
@@ -1109,7 +1109,7 @@
           <a:p>
             <a:fld id="{3E0FA9E5-6744-4841-888F-9E7CC0C2B7EC}" type="datetimeFigureOut">
               <a:rPr lang="en-US"/>
-              <a:t>3/31/2016</a:t>
+              <a:t>4/8/2016</a:t>
             </a:fld>
             <a:endParaRPr/>
           </a:p>
@@ -1308,7 +1308,7 @@
           <a:p>
             <a:fld id="{3E0FA9E5-6744-4841-888F-9E7CC0C2B7EC}" type="datetimeFigureOut">
               <a:rPr lang="en-US"/>
-              <a:t>3/31/2016</a:t>
+              <a:t>4/8/2016</a:t>
             </a:fld>
             <a:endParaRPr/>
           </a:p>
@@ -1497,7 +1497,7 @@
           <a:p>
             <a:fld id="{3E0FA9E5-6744-4841-888F-9E7CC0C2B7EC}" type="datetimeFigureOut">
               <a:rPr lang="en-US"/>
-              <a:t>3/31/2016</a:t>
+              <a:t>4/8/2016</a:t>
             </a:fld>
             <a:endParaRPr/>
           </a:p>
@@ -1784,7 +1784,7 @@
           <a:p>
             <a:fld id="{3E0FA9E5-6744-4841-888F-9E7CC0C2B7EC}" type="datetimeFigureOut">
               <a:rPr lang="en-US"/>
-              <a:t>3/31/2016</a:t>
+              <a:t>4/8/2016</a:t>
             </a:fld>
             <a:endParaRPr/>
           </a:p>
@@ -2095,7 +2095,7 @@
           <a:p>
             <a:fld id="{3E0FA9E5-6744-4841-888F-9E7CC0C2B7EC}" type="datetimeFigureOut">
               <a:rPr lang="en-US"/>
-              <a:t>3/31/2016</a:t>
+              <a:t>4/8/2016</a:t>
             </a:fld>
             <a:endParaRPr/>
           </a:p>
@@ -2555,7 +2555,7 @@
           <a:p>
             <a:fld id="{3E0FA9E5-6744-4841-888F-9E7CC0C2B7EC}" type="datetimeFigureOut">
               <a:rPr lang="en-US"/>
-              <a:t>3/31/2016</a:t>
+              <a:t>4/8/2016</a:t>
             </a:fld>
             <a:endParaRPr/>
           </a:p>
@@ -2692,7 +2692,7 @@
           <a:p>
             <a:fld id="{3E0FA9E5-6744-4841-888F-9E7CC0C2B7EC}" type="datetimeFigureOut">
               <a:rPr lang="en-US"/>
-              <a:t>3/31/2016</a:t>
+              <a:t>4/8/2016</a:t>
             </a:fld>
             <a:endParaRPr/>
           </a:p>
@@ -2820,7 +2820,7 @@
           <a:p>
             <a:fld id="{3E0FA9E5-6744-4841-888F-9E7CC0C2B7EC}" type="datetimeFigureOut">
               <a:rPr lang="en-US"/>
-              <a:t>3/31/2016</a:t>
+              <a:t>4/8/2016</a:t>
             </a:fld>
             <a:endParaRPr/>
           </a:p>
@@ -3149,7 +3149,7 @@
           <a:p>
             <a:fld id="{3E0FA9E5-6744-4841-888F-9E7CC0C2B7EC}" type="datetimeFigureOut">
               <a:rPr lang="en-US"/>
-              <a:t>3/31/2016</a:t>
+              <a:t>4/8/2016</a:t>
             </a:fld>
             <a:endParaRPr/>
           </a:p>
@@ -3638,7 +3638,7 @@
             <a:fld id="{3E0FA9E5-6744-4841-888F-9E7CC0C2B7EC}" type="datetimeFigureOut">
               <a:rPr lang="en-US"/>
               <a:pPr/>
-              <a:t>3/31/2016</a:t>
+              <a:t>4/8/2016</a:t>
             </a:fld>
             <a:endParaRPr/>
           </a:p>
@@ -4956,97 +4956,6 @@
         </p:nvSpPr>
         <p:spPr>
           <a:xfrm>
-            <a:off x="621804" y="260648"/>
-            <a:ext cx="8928992" cy="2414736"/>
-          </a:xfrm>
-        </p:spPr>
-        <p:txBody>
-          <a:bodyPr>
-            <a:normAutofit/>
-          </a:bodyPr>
-          <a:lstStyle/>
-          <a:p>
-            <a:r>
-              <a:rPr lang="en-US" sz="6600" dirty="0" err="1" smtClean="0"/>
-              <a:t>Metodología</a:t>
-            </a:r>
-            <a:r>
-              <a:rPr lang="en-US" sz="6600" dirty="0" smtClean="0"/>
-              <a:t> a </a:t>
-            </a:r>
-            <a:r>
-              <a:rPr lang="en-US" sz="6600" dirty="0" err="1" smtClean="0"/>
-              <a:t>utilizar</a:t>
-            </a:r>
-            <a:r>
-              <a:rPr lang="en-US" sz="6600" dirty="0" smtClean="0"/>
-              <a:t>:</a:t>
-            </a:r>
-            <a:endParaRPr lang="en-US" sz="6600" dirty="0"/>
-          </a:p>
-        </p:txBody>
-      </p:sp>
-    </p:spTree>
-    <p:extLst>
-      <p:ext uri="{BB962C8B-B14F-4D97-AF65-F5344CB8AC3E}">
-        <p14:creationId xmlns:p14="http://schemas.microsoft.com/office/powerpoint/2010/main" val="4131172139"/>
-      </p:ext>
-    </p:extLst>
-  </p:cSld>
-  <p:clrMapOvr>
-    <a:masterClrMapping/>
-  </p:clrMapOvr>
-  <mc:AlternateContent xmlns:mc="http://schemas.openxmlformats.org/markup-compatibility/2006" xmlns:p14="http://schemas.microsoft.com/office/powerpoint/2010/main">
-    <mc:Choice Requires="p14">
-      <p:transition spd="med" p14:dur="700">
-        <p:fade/>
-      </p:transition>
-    </mc:Choice>
-    <mc:Fallback xmlns="">
-      <p:transition spd="med">
-        <p:fade/>
-      </p:transition>
-    </mc:Fallback>
-  </mc:AlternateContent>
-  <p:timing>
-    <p:tnLst>
-      <p:par>
-        <p:cTn id="1" dur="indefinite" restart="never" nodeType="tmRoot"/>
-      </p:par>
-    </p:tnLst>
-  </p:timing>
-</p:sld>
-</file>
-
-<file path=ppt/slides/slide5.xml><?xml version="1.0" encoding="utf-8"?>
-<p:sld xmlns:a="http://schemas.openxmlformats.org/drawingml/2006/main" xmlns:r="http://schemas.openxmlformats.org/officeDocument/2006/relationships" xmlns:p="http://schemas.openxmlformats.org/presentationml/2006/main">
-  <p:cSld>
-    <p:spTree>
-      <p:nvGrpSpPr>
-        <p:cNvPr id="1" name=""/>
-        <p:cNvGrpSpPr/>
-        <p:nvPr/>
-      </p:nvGrpSpPr>
-      <p:grpSpPr>
-        <a:xfrm>
-          <a:off x="0" y="0"/>
-          <a:ext cx="0" cy="0"/>
-          <a:chOff x="0" y="0"/>
-          <a:chExt cx="0" cy="0"/>
-        </a:xfrm>
-      </p:grpSpPr>
-      <p:sp>
-        <p:nvSpPr>
-          <p:cNvPr id="2" name="Título 1"/>
-          <p:cNvSpPr>
-            <a:spLocks noGrp="1"/>
-          </p:cNvSpPr>
-          <p:nvPr>
-            <p:ph type="title"/>
-          </p:nvPr>
-        </p:nvSpPr>
-        <p:spPr>
-          <a:xfrm>
             <a:off x="693812" y="404664"/>
             <a:ext cx="8928992" cy="1262608"/>
           </a:xfrm>
@@ -5139,6 +5048,97 @@
 </p:sld>
 </file>
 
+<file path=ppt/slides/slide5.xml><?xml version="1.0" encoding="utf-8"?>
+<p:sld xmlns:a="http://schemas.openxmlformats.org/drawingml/2006/main" xmlns:r="http://schemas.openxmlformats.org/officeDocument/2006/relationships" xmlns:p="http://schemas.openxmlformats.org/presentationml/2006/main">
+  <p:cSld>
+    <p:spTree>
+      <p:nvGrpSpPr>
+        <p:cNvPr id="1" name=""/>
+        <p:cNvGrpSpPr/>
+        <p:nvPr/>
+      </p:nvGrpSpPr>
+      <p:grpSpPr>
+        <a:xfrm>
+          <a:off x="0" y="0"/>
+          <a:ext cx="0" cy="0"/>
+          <a:chOff x="0" y="0"/>
+          <a:chExt cx="0" cy="0"/>
+        </a:xfrm>
+      </p:grpSpPr>
+      <p:sp>
+        <p:nvSpPr>
+          <p:cNvPr id="2" name="Título 1"/>
+          <p:cNvSpPr>
+            <a:spLocks noGrp="1"/>
+          </p:cNvSpPr>
+          <p:nvPr>
+            <p:ph type="title"/>
+          </p:nvPr>
+        </p:nvSpPr>
+        <p:spPr>
+          <a:xfrm>
+            <a:off x="621804" y="260648"/>
+            <a:ext cx="8928992" cy="2414736"/>
+          </a:xfrm>
+        </p:spPr>
+        <p:txBody>
+          <a:bodyPr>
+            <a:normAutofit/>
+          </a:bodyPr>
+          <a:lstStyle/>
+          <a:p>
+            <a:r>
+              <a:rPr lang="en-US" sz="6600" dirty="0" err="1" smtClean="0"/>
+              <a:t>Metodología</a:t>
+            </a:r>
+            <a:r>
+              <a:rPr lang="en-US" sz="6600" dirty="0" smtClean="0"/>
+              <a:t> a </a:t>
+            </a:r>
+            <a:r>
+              <a:rPr lang="en-US" sz="6600" dirty="0" err="1" smtClean="0"/>
+              <a:t>utilizar</a:t>
+            </a:r>
+            <a:r>
+              <a:rPr lang="en-US" sz="6600" dirty="0" smtClean="0"/>
+              <a:t>:</a:t>
+            </a:r>
+            <a:endParaRPr lang="en-US" sz="6600" dirty="0"/>
+          </a:p>
+        </p:txBody>
+      </p:sp>
+    </p:spTree>
+    <p:extLst>
+      <p:ext uri="{BB962C8B-B14F-4D97-AF65-F5344CB8AC3E}">
+        <p14:creationId xmlns:p14="http://schemas.microsoft.com/office/powerpoint/2010/main" val="4131172139"/>
+      </p:ext>
+    </p:extLst>
+  </p:cSld>
+  <p:clrMapOvr>
+    <a:masterClrMapping/>
+  </p:clrMapOvr>
+  <mc:AlternateContent xmlns:mc="http://schemas.openxmlformats.org/markup-compatibility/2006" xmlns:p14="http://schemas.microsoft.com/office/powerpoint/2010/main">
+    <mc:Choice Requires="p14">
+      <p:transition spd="med" p14:dur="700">
+        <p:fade/>
+      </p:transition>
+    </mc:Choice>
+    <mc:Fallback xmlns="">
+      <p:transition spd="med">
+        <p:fade/>
+      </p:transition>
+    </mc:Fallback>
+  </mc:AlternateContent>
+  <p:timing>
+    <p:tnLst>
+      <p:par>
+        <p:cTn id="1" dur="indefinite" restart="never" nodeType="tmRoot"/>
+      </p:par>
+    </p:tnLst>
+  </p:timing>
+</p:sld>
+</file>
+
 <file path=ppt/slides/slide6.xml><?xml version="1.0" encoding="utf-8"?>
 <p:sld xmlns:a="http://schemas.openxmlformats.org/drawingml/2006/main" xmlns:r="http://schemas.openxmlformats.org/officeDocument/2006/relationships" xmlns:p="http://schemas.openxmlformats.org/presentationml/2006/main">
   <p:cSld>
@@ -5235,10 +5235,6 @@
               <a:rPr lang="es-ES" sz="2400" dirty="0"/>
               <a:t>Es una metodología cuyo fin es entregar un producto de software. Se estructura todos los procesos y se mide la eficiencia de la organización.</a:t>
             </a:r>
-            <a:r>
-              <a:rPr lang="es-ES" sz="2400" dirty="0"/>
-              <a:t/>
-            </a:r>
             <a:br>
               <a:rPr lang="es-ES" sz="2400" dirty="0"/>
             </a:br>
@@ -5254,10 +5250,6 @@
               <a:rPr lang="es-ES" sz="2400" dirty="0"/>
               <a:t>el cual utiliza el lenguaje unificado de modelado UML, constituye la metodología estándar más utilizada para el análisis, implementación y documentación de sistemas orientados a objetos.</a:t>
             </a:r>
-            <a:r>
-              <a:rPr lang="es-ES" sz="2400" dirty="0"/>
-              <a:t/>
-            </a:r>
             <a:br>
               <a:rPr lang="es-ES" sz="2400" dirty="0"/>
             </a:br>
@@ -5265,10 +5257,6 @@
               <a:rPr lang="es-ES" sz="2400" dirty="0"/>
               <a:t>El RUP es un conjunto de metodologías adaptables al contexto y necesidades de cada organización.</a:t>
             </a:r>
-            <a:r>
-              <a:rPr lang="es-ES" sz="2400" dirty="0"/>
-              <a:t/>
-            </a:r>
             <a:br>
               <a:rPr lang="es-ES" sz="2400" dirty="0"/>
             </a:br>
@@ -5276,10 +5264,6 @@
               <a:rPr lang="es-ES" sz="2400" dirty="0"/>
               <a:t>Describe como aplicar enfoques para el desarrollo del software, llevando a cabo unos pasos para su realización.</a:t>
             </a:r>
-            <a:r>
-              <a:rPr lang="es-ES" sz="2400" dirty="0"/>
-              <a:t/>
-            </a:r>
             <a:br>
               <a:rPr lang="es-ES" sz="2400" dirty="0"/>
             </a:br>
@@ -5287,7 +5271,6 @@
               <a:rPr lang="es-ES" sz="2400" dirty="0"/>
               <a:t>Se centra en la producción y mantenimiento de modelos del sistema.</a:t>
             </a:r>
-            <a:endParaRPr lang="es-ES" sz="2400" dirty="0"/>
           </a:p>
         </p:txBody>
       </p:sp>

</xml_diff>